<commit_message>
Tighten up the design
Tighten up the design a bit and added the PDF version.
</commit_message>
<xml_diff>
--- a/DoD EvoCycle.pptx
+++ b/DoD EvoCycle.pptx
@@ -3799,7 +3799,7 @@
         <p:spPr>
           <a:xfrm>
             <a:off x="201707" y="5705579"/>
-            <a:ext cx="11779622" cy="946254"/>
+            <a:ext cx="11779622" cy="727218"/>
           </a:xfrm>
           <a:prstGeom prst="roundRect">
             <a:avLst/>
@@ -3807,7 +3807,7 @@
           <a:solidFill>
             <a:srgbClr val="DE8444"/>
           </a:solidFill>
-          <a:ln w="38100">
+          <a:ln w="25400">
             <a:solidFill>
               <a:schemeClr val="tx1"/>
             </a:solidFill>
@@ -3893,12 +3893,12 @@
         <p:spPr>
           <a:xfrm>
             <a:off x="4135793" y="551951"/>
-            <a:ext cx="0" cy="6099882"/>
+            <a:ext cx="0" cy="5880846"/>
           </a:xfrm>
           <a:prstGeom prst="line">
             <a:avLst/>
           </a:prstGeom>
-          <a:ln w="63500">
+          <a:ln w="25400">
             <a:solidFill>
               <a:schemeClr val="tx1"/>
             </a:solidFill>
@@ -3936,12 +3936,12 @@
         <p:spPr>
           <a:xfrm>
             <a:off x="8090818" y="551951"/>
-            <a:ext cx="0" cy="6099882"/>
+            <a:ext cx="0" cy="5880846"/>
           </a:xfrm>
           <a:prstGeom prst="line">
             <a:avLst/>
           </a:prstGeom>
-          <a:ln w="63500">
+          <a:ln w="25400">
             <a:solidFill>
               <a:schemeClr val="tx1"/>
             </a:solidFill>
@@ -3984,7 +3984,7 @@
           <a:prstGeom prst="line">
             <a:avLst/>
           </a:prstGeom>
-          <a:ln w="63500">
+          <a:ln w="25400">
             <a:solidFill>
               <a:schemeClr val="tx1"/>
             </a:solidFill>
@@ -5262,8 +5262,8 @@
         </p:nvSpPr>
         <p:spPr>
           <a:xfrm>
-            <a:off x="871541" y="5895811"/>
-            <a:ext cx="1322798" cy="553998"/>
+            <a:off x="907323" y="5805827"/>
+            <a:ext cx="1322799" cy="553998"/>
           </a:xfrm>
           <a:prstGeom prst="rect">
             <a:avLst/>
@@ -5299,7 +5299,7 @@
         </p:nvSpPr>
         <p:spPr>
           <a:xfrm>
-            <a:off x="2239852" y="5826562"/>
+            <a:off x="2188840" y="5740303"/>
             <a:ext cx="2597426" cy="692497"/>
           </a:xfrm>
           <a:prstGeom prst="rect">
@@ -5373,7 +5373,7 @@
         </p:nvSpPr>
         <p:spPr>
           <a:xfrm>
-            <a:off x="4686916" y="5897004"/>
+            <a:off x="4859100" y="5818827"/>
             <a:ext cx="744113" cy="553998"/>
           </a:xfrm>
           <a:prstGeom prst="rect">
@@ -5410,8 +5410,8 @@
         </p:nvSpPr>
         <p:spPr>
           <a:xfrm>
-            <a:off x="5487041" y="5765488"/>
-            <a:ext cx="3506491" cy="784830"/>
+            <a:off x="5613497" y="5740302"/>
+            <a:ext cx="3506491" cy="692497"/>
           </a:xfrm>
           <a:prstGeom prst="rect">
             <a:avLst/>
@@ -5425,13 +5425,13 @@
           <a:lstStyle/>
           <a:p>
             <a:r>
-              <a:rPr lang="en-NL" sz="1500" b="1" dirty="0">
+              <a:rPr lang="en-NL" sz="1300" b="1" dirty="0">
                 <a:latin typeface="+mj-lt"/>
               </a:rPr>
               <a:t>MEANS </a:t>
             </a:r>
             <a:r>
-              <a:rPr lang="en-NL" sz="1500" dirty="0">
+              <a:rPr lang="en-NL" sz="1300" dirty="0">
                 <a:solidFill>
                   <a:schemeClr val="bg1"/>
                 </a:solidFill>
@@ -5440,7 +5440,7 @@
               <a:t>POTENTIALLY</a:t>
             </a:r>
             <a:br>
-              <a:rPr lang="en-NL" sz="1500" dirty="0">
+              <a:rPr lang="en-NL" sz="1300" dirty="0">
                 <a:solidFill>
                   <a:schemeClr val="bg1"/>
                 </a:solidFill>
@@ -5448,7 +5448,7 @@
               </a:rPr>
             </a:br>
             <a:r>
-              <a:rPr lang="en-NL" sz="1500" dirty="0">
+              <a:rPr lang="en-NL" sz="1300" dirty="0">
                 <a:solidFill>
                   <a:schemeClr val="bg1"/>
                 </a:solidFill>
@@ -5457,7 +5457,7 @@
               <a:t>RELEASABLE INCREMENT</a:t>
             </a:r>
             <a:br>
-              <a:rPr lang="en-NL" sz="1500" dirty="0">
+              <a:rPr lang="en-NL" sz="1300" dirty="0">
                 <a:solidFill>
                   <a:schemeClr val="bg1"/>
                 </a:solidFill>
@@ -5465,7 +5465,7 @@
               </a:rPr>
             </a:br>
             <a:r>
-              <a:rPr lang="en-NL" sz="1500" dirty="0">
+              <a:rPr lang="en-NL" sz="1300" dirty="0">
                 <a:solidFill>
                   <a:schemeClr val="bg1"/>
                 </a:solidFill>
@@ -5490,7 +5490,7 @@
         </p:nvSpPr>
         <p:spPr>
           <a:xfrm>
-            <a:off x="8776281" y="5880904"/>
+            <a:off x="8732738" y="5805827"/>
             <a:ext cx="963725" cy="553998"/>
           </a:xfrm>
           <a:prstGeom prst="rect">
@@ -5527,7 +5527,7 @@
         </p:nvSpPr>
         <p:spPr>
           <a:xfrm>
-            <a:off x="9696463" y="5826562"/>
+            <a:off x="9682599" y="5743507"/>
             <a:ext cx="2014903" cy="892552"/>
           </a:xfrm>
           <a:prstGeom prst="rect">
@@ -5615,7 +5615,7 @@
         </p:nvSpPr>
         <p:spPr>
           <a:xfrm>
-            <a:off x="10567237" y="5911681"/>
+            <a:off x="10542799" y="5836604"/>
             <a:ext cx="1977523" cy="492443"/>
           </a:xfrm>
           <a:prstGeom prst="rect">
@@ -5690,6 +5690,45 @@
           </a:prstGeom>
         </p:spPr>
       </p:pic>
+      <p:sp>
+        <p:nvSpPr>
+          <p:cNvPr id="7" name="Rectangle 6">
+            <a:extLst>
+              <a:ext uri="{FF2B5EF4-FFF2-40B4-BE49-F238E27FC236}">
+                <a16:creationId xmlns:a16="http://schemas.microsoft.com/office/drawing/2014/main" id="{F8F615E6-7F7C-604A-A4B0-677DC0AC0C64}"/>
+              </a:ext>
+            </a:extLst>
+          </p:cNvPr>
+          <p:cNvSpPr/>
+          <p:nvPr/>
+        </p:nvSpPr>
+        <p:spPr>
+          <a:xfrm>
+            <a:off x="6166441" y="6538336"/>
+            <a:ext cx="5907094" cy="215444"/>
+          </a:xfrm>
+          <a:prstGeom prst="rect">
+            <a:avLst/>
+          </a:prstGeom>
+        </p:spPr>
+        <p:txBody>
+          <a:bodyPr wrap="square">
+            <a:spAutoFit/>
+          </a:bodyPr>
+          <a:lstStyle/>
+          <a:p>
+            <a:pPr algn="r"/>
+            <a:r>
+              <a:rPr lang="en-NL" sz="800" dirty="0">
+                <a:solidFill>
+                  <a:schemeClr val="accent3"/>
+                </a:solidFill>
+              </a:rPr>
+              <a:t>DoD EvoCycle by Scrum Facilitators is licensed under CC BY-NC-SA. All the materials in this repository are subject to this license</a:t>
+            </a:r>
+          </a:p>
+        </p:txBody>
+      </p:sp>
     </p:spTree>
     <p:extLst>
       <p:ext uri="{BB962C8B-B14F-4D97-AF65-F5344CB8AC3E}">

</xml_diff>

<commit_message>
Correct typo in middle box (influences should be influence) AND added version nr 1.0.1 for minor change
</commit_message>
<xml_diff>
--- a/DoD EvoCycle.pptx
+++ b/DoD EvoCycle.pptx
@@ -197,7 +197,7 @@
           <a:p>
             <a:fld id="{0C2D1B16-4C61-6A49-A45C-1D102A04470E}" type="datetimeFigureOut">
               <a:rPr lang="en-NL" smtClean="0"/>
-              <a:t>22/06/2020</a:t>
+              <a:t>24/05/2022</a:t>
             </a:fld>
             <a:endParaRPr lang="en-NL"/>
           </a:p>
@@ -698,7 +698,7 @@
           <a:p>
             <a:fld id="{77089BCE-1D5C-8241-B7EB-79E0A1CADE1F}" type="datetimeFigureOut">
               <a:rPr lang="en-NL" smtClean="0"/>
-              <a:t>22/06/2020</a:t>
+              <a:t>24/05/2022</a:t>
             </a:fld>
             <a:endParaRPr lang="en-NL"/>
           </a:p>
@@ -898,7 +898,7 @@
           <a:p>
             <a:fld id="{77089BCE-1D5C-8241-B7EB-79E0A1CADE1F}" type="datetimeFigureOut">
               <a:rPr lang="en-NL" smtClean="0"/>
-              <a:t>22/06/2020</a:t>
+              <a:t>24/05/2022</a:t>
             </a:fld>
             <a:endParaRPr lang="en-NL"/>
           </a:p>
@@ -1108,7 +1108,7 @@
           <a:p>
             <a:fld id="{77089BCE-1D5C-8241-B7EB-79E0A1CADE1F}" type="datetimeFigureOut">
               <a:rPr lang="en-NL" smtClean="0"/>
-              <a:t>22/06/2020</a:t>
+              <a:t>24/05/2022</a:t>
             </a:fld>
             <a:endParaRPr lang="en-NL"/>
           </a:p>
@@ -1308,7 +1308,7 @@
           <a:p>
             <a:fld id="{77089BCE-1D5C-8241-B7EB-79E0A1CADE1F}" type="datetimeFigureOut">
               <a:rPr lang="en-NL" smtClean="0"/>
-              <a:t>22/06/2020</a:t>
+              <a:t>24/05/2022</a:t>
             </a:fld>
             <a:endParaRPr lang="en-NL"/>
           </a:p>
@@ -1584,7 +1584,7 @@
           <a:p>
             <a:fld id="{77089BCE-1D5C-8241-B7EB-79E0A1CADE1F}" type="datetimeFigureOut">
               <a:rPr lang="en-NL" smtClean="0"/>
-              <a:t>22/06/2020</a:t>
+              <a:t>24/05/2022</a:t>
             </a:fld>
             <a:endParaRPr lang="en-NL"/>
           </a:p>
@@ -1852,7 +1852,7 @@
           <a:p>
             <a:fld id="{77089BCE-1D5C-8241-B7EB-79E0A1CADE1F}" type="datetimeFigureOut">
               <a:rPr lang="en-NL" smtClean="0"/>
-              <a:t>22/06/2020</a:t>
+              <a:t>24/05/2022</a:t>
             </a:fld>
             <a:endParaRPr lang="en-NL"/>
           </a:p>
@@ -2267,7 +2267,7 @@
           <a:p>
             <a:fld id="{77089BCE-1D5C-8241-B7EB-79E0A1CADE1F}" type="datetimeFigureOut">
               <a:rPr lang="en-NL" smtClean="0"/>
-              <a:t>22/06/2020</a:t>
+              <a:t>24/05/2022</a:t>
             </a:fld>
             <a:endParaRPr lang="en-NL"/>
           </a:p>
@@ -2409,7 +2409,7 @@
           <a:p>
             <a:fld id="{77089BCE-1D5C-8241-B7EB-79E0A1CADE1F}" type="datetimeFigureOut">
               <a:rPr lang="en-NL" smtClean="0"/>
-              <a:t>22/06/2020</a:t>
+              <a:t>24/05/2022</a:t>
             </a:fld>
             <a:endParaRPr lang="en-NL"/>
           </a:p>
@@ -2522,7 +2522,7 @@
           <a:p>
             <a:fld id="{77089BCE-1D5C-8241-B7EB-79E0A1CADE1F}" type="datetimeFigureOut">
               <a:rPr lang="en-NL" smtClean="0"/>
-              <a:t>22/06/2020</a:t>
+              <a:t>24/05/2022</a:t>
             </a:fld>
             <a:endParaRPr lang="en-NL"/>
           </a:p>
@@ -2835,7 +2835,7 @@
           <a:p>
             <a:fld id="{77089BCE-1D5C-8241-B7EB-79E0A1CADE1F}" type="datetimeFigureOut">
               <a:rPr lang="en-NL" smtClean="0"/>
-              <a:t>22/06/2020</a:t>
+              <a:t>24/05/2022</a:t>
             </a:fld>
             <a:endParaRPr lang="en-NL"/>
           </a:p>
@@ -3124,7 +3124,7 @@
           <a:p>
             <a:fld id="{77089BCE-1D5C-8241-B7EB-79E0A1CADE1F}" type="datetimeFigureOut">
               <a:rPr lang="en-NL" smtClean="0"/>
-              <a:t>22/06/2020</a:t>
+              <a:t>24/05/2022</a:t>
             </a:fld>
             <a:endParaRPr lang="en-NL"/>
           </a:p>
@@ -3367,7 +3367,7 @@
           <a:p>
             <a:fld id="{77089BCE-1D5C-8241-B7EB-79E0A1CADE1F}" type="datetimeFigureOut">
               <a:rPr lang="en-NL" smtClean="0"/>
-              <a:t>22/06/2020</a:t>
+              <a:t>24/05/2022</a:t>
             </a:fld>
             <a:endParaRPr lang="en-NL"/>
           </a:p>
@@ -5084,7 +5084,7 @@
                 </a:solidFill>
                 <a:latin typeface="Rockwell" panose="02060603020205020403" pitchFamily="18" charset="77"/>
               </a:rPr>
-              <a:t>Activities that are inside the influences of the team, but not picked up yet.</a:t>
+              <a:t>Activities that are inside the influence of the team, but not picked up yet.</a:t>
             </a:r>
           </a:p>
         </p:txBody>
@@ -5724,7 +5724,23 @@
                   <a:schemeClr val="accent3"/>
                 </a:solidFill>
               </a:rPr>
-              <a:t>DoD EvoCycle by Scrum Facilitators is licensed under CC BY-NC-SA. All the materials in this repository are subject to this license</a:t>
+              <a:t>DoD </a:t>
+            </a:r>
+            <a:r>
+              <a:rPr lang="en-NL" sz="800">
+                <a:solidFill>
+                  <a:schemeClr val="accent3"/>
+                </a:solidFill>
+              </a:rPr>
+              <a:t>EvoCycle v1.0.1 by </a:t>
+            </a:r>
+            <a:r>
+              <a:rPr lang="en-NL" sz="800" dirty="0">
+                <a:solidFill>
+                  <a:schemeClr val="accent3"/>
+                </a:solidFill>
+              </a:rPr>
+              <a:t>Scrum Facilitators is licensed under CC BY-NC-SA. All the materials in this repository are subject to this license</a:t>
             </a:r>
           </a:p>
         </p:txBody>

</xml_diff>